<commit_message>
Added presentation (as pdf)
</commit_message>
<xml_diff>
--- a/presentation/Final_presentation.pptx
+++ b/presentation/Final_presentation.pptx
@@ -9,9 +9,12 @@
     <p:sldId id="257" r:id="rId3"/>
     <p:sldId id="259" r:id="rId4"/>
     <p:sldId id="260" r:id="rId5"/>
-    <p:sldId id="258" r:id="rId6"/>
-    <p:sldId id="261" r:id="rId7"/>
+    <p:sldId id="261" r:id="rId6"/>
+    <p:sldId id="258" r:id="rId7"/>
     <p:sldId id="262" r:id="rId8"/>
+    <p:sldId id="265" r:id="rId9"/>
+    <p:sldId id="266" r:id="rId10"/>
+    <p:sldId id="264" r:id="rId11"/>
   </p:sldIdLst>
   <p:sldSz cx="9144000" cy="6858000" type="screen4x3"/>
   <p:notesSz cx="6858000" cy="9144000"/>
@@ -110,7 +113,16 @@
       </a:defRPr>
     </a:lvl9pPr>
   </p:defaultTextStyle>
+  <p:extLst>
+    <p:ext uri="{EFAFB233-063F-42B5-8137-9DF3F51BA10A}">
+      <p15:sldGuideLst xmlns:p15="http://schemas.microsoft.com/office/powerpoint/2012/main"/>
+    </p:ext>
+  </p:extLst>
 </p:presentation>
+</file>
+
+<file path=ppt/revisionInfo.xml><?xml version="1.0" encoding="utf-8"?>
+<p1510:revInfo xmlns:a="http://schemas.openxmlformats.org/drawingml/2006/main" xmlns:r="http://schemas.openxmlformats.org/officeDocument/2006/relationships" xmlns:p1510="http://schemas.microsoft.com/office/powerpoint/2015/10/main"/>
 </file>
 
 <file path=ppt/slideLayouts/slideLayout1.xml><?xml version="1.0" encoding="utf-8"?>
@@ -6073,7 +6085,12 @@
             <p:ph type="ctrTitle"/>
           </p:nvPr>
         </p:nvSpPr>
-        <p:spPr/>
+        <p:spPr>
+          <a:xfrm>
+            <a:off x="1130595" y="904240"/>
+            <a:ext cx="5826719" cy="3146596"/>
+          </a:xfrm>
+        </p:spPr>
         <p:txBody>
           <a:bodyPr/>
           <a:lstStyle/>
@@ -6105,6 +6122,78 @@
               <a:rPr lang="de-CH" dirty="0"/>
               <a:t>Manuel Bröchin, Renato Menta, Oliver Blaser</a:t>
             </a:r>
+          </a:p>
+        </p:txBody>
+      </p:sp>
+    </p:spTree>
+    <p:extLst>
+      <p:ext uri="{BB962C8B-B14F-4D97-AF65-F5344CB8AC3E}">
+        <p14:creationId xmlns:p14="http://schemas.microsoft.com/office/powerpoint/2010/main" val="4087655231"/>
+      </p:ext>
+    </p:extLst>
+  </p:cSld>
+  <p:clrMapOvr>
+    <a:masterClrMapping/>
+  </p:clrMapOvr>
+</p:sld>
+</file>
+
+<file path=ppt/slides/slide10.xml><?xml version="1.0" encoding="utf-8"?>
+<p:sld xmlns:a="http://schemas.openxmlformats.org/drawingml/2006/main" xmlns:r="http://schemas.openxmlformats.org/officeDocument/2006/relationships" xmlns:p="http://schemas.openxmlformats.org/presentationml/2006/main">
+  <p:cSld>
+    <p:spTree>
+      <p:nvGrpSpPr>
+        <p:cNvPr id="1" name=""/>
+        <p:cNvGrpSpPr/>
+        <p:nvPr/>
+      </p:nvGrpSpPr>
+      <p:grpSpPr>
+        <a:xfrm>
+          <a:off x="0" y="0"/>
+          <a:ext cx="0" cy="0"/>
+          <a:chOff x="0" y="0"/>
+          <a:chExt cx="0" cy="0"/>
+        </a:xfrm>
+      </p:grpSpPr>
+      <p:sp>
+        <p:nvSpPr>
+          <p:cNvPr id="2" name="Title 1"/>
+          <p:cNvSpPr>
+            <a:spLocks noGrp="1"/>
+          </p:cNvSpPr>
+          <p:nvPr>
+            <p:ph type="ctrTitle"/>
+          </p:nvPr>
+        </p:nvSpPr>
+        <p:spPr/>
+        <p:txBody>
+          <a:bodyPr/>
+          <a:lstStyle/>
+          <a:p>
+            <a:pPr algn="ctr"/>
+            <a:r>
+              <a:rPr lang="de-CH" sz="4800" dirty="0"/>
+              <a:t>Thank you for your attention!</a:t>
+            </a:r>
+          </a:p>
+        </p:txBody>
+      </p:sp>
+      <p:sp>
+        <p:nvSpPr>
+          <p:cNvPr id="3" name="Subtitle 2"/>
+          <p:cNvSpPr>
+            <a:spLocks noGrp="1"/>
+          </p:cNvSpPr>
+          <p:nvPr>
+            <p:ph type="subTitle" idx="1"/>
+          </p:nvPr>
+        </p:nvSpPr>
+        <p:spPr/>
+        <p:txBody>
+          <a:bodyPr/>
+          <a:lstStyle/>
+          <a:p>
+            <a:endParaRPr lang="de-CH" dirty="0"/>
           </a:p>
         </p:txBody>
       </p:sp>
@@ -6119,6 +6208,19 @@
         <p:blipFill>
           <a:blip r:embed="rId2">
             <a:extLst>
+              <a:ext uri="{BEBA8EAE-BF5A-486C-A8C5-ECC9F3942E4B}">
+                <a14:imgProps xmlns:a14="http://schemas.microsoft.com/office/drawing/2010/main">
+                  <a14:imgLayer r:embed="rId3">
+                    <a14:imgEffect>
+                      <a14:backgroundRemoval t="6000" b="90000" l="9975" r="89776">
+                        <a14:foregroundMark x1="45885" y1="6000" x2="45885" y2="6000"/>
+                        <a14:foregroundMark x1="71322" y1="22889" x2="71322" y2="22889"/>
+                        <a14:foregroundMark x1="70574" y1="21111" x2="70574" y2="21111"/>
+                      </a14:backgroundRemoval>
+                    </a14:imgEffect>
+                  </a14:imgLayer>
+                </a14:imgProps>
+              </a:ext>
               <a:ext uri="{28A0092B-C50C-407E-A947-70E740481C1C}">
                 <a14:useLocalDpi xmlns:a14="http://schemas.microsoft.com/office/drawing/2010/main" val="0"/>
               </a:ext>
@@ -6130,8 +6232,8 @@
           </a:stretch>
         </p:blipFill>
         <p:spPr bwMode="auto">
-          <a:xfrm rot="20028512">
-            <a:off x="7041003" y="4631008"/>
+          <a:xfrm rot="19904572">
+            <a:off x="7085227" y="4758955"/>
             <a:ext cx="2864644" cy="3214688"/>
           </a:xfrm>
           <a:prstGeom prst="rect">
@@ -6152,7 +6254,7 @@
     </p:spTree>
     <p:extLst>
       <p:ext uri="{BB962C8B-B14F-4D97-AF65-F5344CB8AC3E}">
-        <p14:creationId xmlns:p14="http://schemas.microsoft.com/office/powerpoint/2010/main" val="4087655231"/>
+        <p14:creationId xmlns:p14="http://schemas.microsoft.com/office/powerpoint/2010/main" val="1698539880"/>
       </p:ext>
     </p:extLst>
   </p:cSld>
@@ -6228,15 +6330,16 @@
           </p:cNvPicPr>
           <p:nvPr/>
         </p:nvPicPr>
-        <p:blipFill rotWithShape="1">
+        <p:blipFill>
           <a:blip r:embed="rId2"/>
-          <a:srcRect l="665" r="33638" b="26751"/>
-          <a:stretch/>
+          <a:stretch>
+            <a:fillRect/>
+          </a:stretch>
         </p:blipFill>
         <p:spPr>
           <a:xfrm>
-            <a:off x="450534" y="1032388"/>
-            <a:ext cx="8210002" cy="5149047"/>
+            <a:off x="139878" y="609600"/>
+            <a:ext cx="8830832" cy="5571835"/>
           </a:xfrm>
           <a:prstGeom prst="rect">
             <a:avLst/>
@@ -6404,8 +6507,8 @@
         </p:nvCxnSpPr>
         <p:spPr>
           <a:xfrm flipV="1">
-            <a:off x="-2015196" y="3912510"/>
-            <a:ext cx="3591530" cy="3235100"/>
+            <a:off x="-1172308" y="3912510"/>
+            <a:ext cx="2748642" cy="2558628"/>
           </a:xfrm>
           <a:prstGeom prst="line">
             <a:avLst/>
@@ -6443,9 +6546,9 @@
           <p:nvPr/>
         </p:nvCxnSpPr>
         <p:spPr>
-          <a:xfrm flipV="1">
-            <a:off x="-7088412" y="3507364"/>
-            <a:ext cx="8496930" cy="806878"/>
+          <a:xfrm>
+            <a:off x="-1172308" y="3322729"/>
+            <a:ext cx="2580826" cy="184636"/>
           </a:xfrm>
           <a:prstGeom prst="line">
             <a:avLst/>
@@ -6484,8 +6587,8 @@
         </p:nvCxnSpPr>
         <p:spPr>
           <a:xfrm flipV="1">
-            <a:off x="2386624" y="-929640"/>
-            <a:ext cx="4669496" cy="4031860"/>
+            <a:off x="2386624" y="-633046"/>
+            <a:ext cx="4444062" cy="3735266"/>
           </a:xfrm>
           <a:prstGeom prst="line">
             <a:avLst/>
@@ -6525,7 +6628,7 @@
         <p:spPr>
           <a:xfrm>
             <a:off x="2386624" y="3912510"/>
-            <a:ext cx="3591530" cy="5053778"/>
+            <a:ext cx="2537068" cy="3730936"/>
           </a:xfrm>
           <a:prstGeom prst="line">
             <a:avLst/>
@@ -6833,6 +6936,148 @@
           <a:chExt cx="0" cy="0"/>
         </a:xfrm>
       </p:grpSpPr>
+      <p:sp>
+        <p:nvSpPr>
+          <p:cNvPr id="2" name="Title 1"/>
+          <p:cNvSpPr>
+            <a:spLocks noGrp="1"/>
+          </p:cNvSpPr>
+          <p:nvPr>
+            <p:ph type="title"/>
+          </p:nvPr>
+        </p:nvSpPr>
+        <p:spPr/>
+        <p:txBody>
+          <a:bodyPr/>
+          <a:lstStyle/>
+          <a:p>
+            <a:r>
+              <a:rPr lang="de-CH" dirty="0"/>
+              <a:t>Decision making</a:t>
+            </a:r>
+          </a:p>
+        </p:txBody>
+      </p:sp>
+      <p:sp>
+        <p:nvSpPr>
+          <p:cNvPr id="3" name="Content Placeholder 2"/>
+          <p:cNvSpPr>
+            <a:spLocks noGrp="1"/>
+          </p:cNvSpPr>
+          <p:nvPr>
+            <p:ph idx="1"/>
+          </p:nvPr>
+        </p:nvSpPr>
+        <p:spPr>
+          <a:xfrm>
+            <a:off x="609599" y="1484672"/>
+            <a:ext cx="6347714" cy="4556692"/>
+          </a:xfrm>
+        </p:spPr>
+        <p:txBody>
+          <a:bodyPr/>
+          <a:lstStyle/>
+          <a:p>
+            <a:r>
+              <a:rPr lang="de-CH" dirty="0"/>
+              <a:t>In order to decide to whom the agent wants to propose, he computes:</a:t>
+            </a:r>
+          </a:p>
+          <a:p>
+            <a:endParaRPr lang="de-CH" dirty="0"/>
+          </a:p>
+          <a:p>
+            <a:endParaRPr lang="de-CH" dirty="0"/>
+          </a:p>
+          <a:p>
+            <a:endParaRPr lang="de-CH" dirty="0"/>
+          </a:p>
+          <a:p>
+            <a:r>
+              <a:rPr lang="de-CH" dirty="0"/>
+              <a:t>In order to decide which trade to accept, he computes:</a:t>
+            </a:r>
+          </a:p>
+        </p:txBody>
+      </p:sp>
+      <p:pic>
+        <p:nvPicPr>
+          <p:cNvPr id="5" name="Picture 4"/>
+          <p:cNvPicPr>
+            <a:picLocks noChangeAspect="1"/>
+          </p:cNvPicPr>
+          <p:nvPr/>
+        </p:nvPicPr>
+        <p:blipFill>
+          <a:blip r:embed="rId2"/>
+          <a:stretch>
+            <a:fillRect/>
+          </a:stretch>
+        </p:blipFill>
+        <p:spPr>
+          <a:xfrm>
+            <a:off x="863773" y="2222749"/>
+            <a:ext cx="6447501" cy="739976"/>
+          </a:xfrm>
+          <a:prstGeom prst="rect">
+            <a:avLst/>
+          </a:prstGeom>
+        </p:spPr>
+      </p:pic>
+      <p:pic>
+        <p:nvPicPr>
+          <p:cNvPr id="8" name="Picture 7"/>
+          <p:cNvPicPr>
+            <a:picLocks noChangeAspect="1"/>
+          </p:cNvPicPr>
+          <p:nvPr/>
+        </p:nvPicPr>
+        <p:blipFill>
+          <a:blip r:embed="rId3"/>
+          <a:stretch>
+            <a:fillRect/>
+          </a:stretch>
+        </p:blipFill>
+        <p:spPr>
+          <a:xfrm>
+            <a:off x="1107613" y="3763018"/>
+            <a:ext cx="6093539" cy="1513682"/>
+          </a:xfrm>
+          <a:prstGeom prst="rect">
+            <a:avLst/>
+          </a:prstGeom>
+        </p:spPr>
+      </p:pic>
+    </p:spTree>
+    <p:extLst>
+      <p:ext uri="{BB962C8B-B14F-4D97-AF65-F5344CB8AC3E}">
+        <p14:creationId xmlns:p14="http://schemas.microsoft.com/office/powerpoint/2010/main" val="544881558"/>
+      </p:ext>
+    </p:extLst>
+  </p:cSld>
+  <p:clrMapOvr>
+    <a:masterClrMapping/>
+  </p:clrMapOvr>
+</p:sld>
+</file>
+
+<file path=ppt/slides/slide6.xml><?xml version="1.0" encoding="utf-8"?>
+<p:sld xmlns:a="http://schemas.openxmlformats.org/drawingml/2006/main" xmlns:r="http://schemas.openxmlformats.org/officeDocument/2006/relationships" xmlns:p="http://schemas.openxmlformats.org/presentationml/2006/main">
+  <p:cSld>
+    <p:spTree>
+      <p:nvGrpSpPr>
+        <p:cNvPr id="1" name=""/>
+        <p:cNvGrpSpPr/>
+        <p:nvPr/>
+      </p:nvGrpSpPr>
+      <p:grpSpPr>
+        <a:xfrm>
+          <a:off x="0" y="0"/>
+          <a:ext cx="0" cy="0"/>
+          <a:chOff x="0" y="0"/>
+          <a:chExt cx="0" cy="0"/>
+        </a:xfrm>
+      </p:grpSpPr>
       <p:grpSp>
         <p:nvGrpSpPr>
           <p:cNvPr id="47" name="Group 46"/>
@@ -6841,10 +7086,10 @@
         </p:nvGrpSpPr>
         <p:grpSpPr>
           <a:xfrm>
-            <a:off x="451384" y="2038567"/>
-            <a:ext cx="5144744" cy="3911878"/>
-            <a:chOff x="583557" y="772931"/>
-            <a:chExt cx="8001216" cy="6083837"/>
+            <a:off x="508025" y="2038567"/>
+            <a:ext cx="5088103" cy="3681045"/>
+            <a:chOff x="671646" y="772931"/>
+            <a:chExt cx="7913127" cy="5724840"/>
           </a:xfrm>
         </p:grpSpPr>
         <p:sp>
@@ -7461,8 +7706,8 @@
           </p:nvSpPr>
           <p:spPr>
             <a:xfrm>
-              <a:off x="7182309" y="5995178"/>
-              <a:ext cx="904753" cy="861590"/>
+              <a:off x="7182308" y="5995178"/>
+              <a:ext cx="1402465" cy="502593"/>
             </a:xfrm>
             <a:prstGeom prst="rect">
               <a:avLst/>
@@ -7490,8 +7735,8 @@
           </p:nvSpPr>
           <p:spPr>
             <a:xfrm>
-              <a:off x="2859911" y="5706060"/>
-              <a:ext cx="904753" cy="861590"/>
+              <a:off x="2859909" y="5706060"/>
+              <a:ext cx="1161519" cy="502593"/>
             </a:xfrm>
             <a:prstGeom prst="rect">
               <a:avLst/>
@@ -7519,8 +7764,8 @@
           </p:nvSpPr>
           <p:spPr>
             <a:xfrm>
-              <a:off x="5020624" y="1131487"/>
-              <a:ext cx="904753" cy="861590"/>
+              <a:off x="5020622" y="1131487"/>
+              <a:ext cx="1228754" cy="502593"/>
             </a:xfrm>
             <a:prstGeom prst="rect">
               <a:avLst/>
@@ -7548,8 +7793,8 @@
           </p:nvSpPr>
           <p:spPr>
             <a:xfrm>
-              <a:off x="583557" y="3414528"/>
-              <a:ext cx="904753" cy="861590"/>
+              <a:off x="671646" y="4404523"/>
+              <a:ext cx="1113829" cy="502593"/>
             </a:xfrm>
             <a:prstGeom prst="rect">
               <a:avLst/>
@@ -7931,148 +8176,6 @@
     <p:extLst>
       <p:ext uri="{BB962C8B-B14F-4D97-AF65-F5344CB8AC3E}">
         <p14:creationId xmlns:p14="http://schemas.microsoft.com/office/powerpoint/2010/main" val="1355793011"/>
-      </p:ext>
-    </p:extLst>
-  </p:cSld>
-  <p:clrMapOvr>
-    <a:masterClrMapping/>
-  </p:clrMapOvr>
-</p:sld>
-</file>
-
-<file path=ppt/slides/slide6.xml><?xml version="1.0" encoding="utf-8"?>
-<p:sld xmlns:a="http://schemas.openxmlformats.org/drawingml/2006/main" xmlns:r="http://schemas.openxmlformats.org/officeDocument/2006/relationships" xmlns:p="http://schemas.openxmlformats.org/presentationml/2006/main">
-  <p:cSld>
-    <p:spTree>
-      <p:nvGrpSpPr>
-        <p:cNvPr id="1" name=""/>
-        <p:cNvGrpSpPr/>
-        <p:nvPr/>
-      </p:nvGrpSpPr>
-      <p:grpSpPr>
-        <a:xfrm>
-          <a:off x="0" y="0"/>
-          <a:ext cx="0" cy="0"/>
-          <a:chOff x="0" y="0"/>
-          <a:chExt cx="0" cy="0"/>
-        </a:xfrm>
-      </p:grpSpPr>
-      <p:sp>
-        <p:nvSpPr>
-          <p:cNvPr id="2" name="Title 1"/>
-          <p:cNvSpPr>
-            <a:spLocks noGrp="1"/>
-          </p:cNvSpPr>
-          <p:nvPr>
-            <p:ph type="title"/>
-          </p:nvPr>
-        </p:nvSpPr>
-        <p:spPr/>
-        <p:txBody>
-          <a:bodyPr/>
-          <a:lstStyle/>
-          <a:p>
-            <a:r>
-              <a:rPr lang="de-CH" dirty="0"/>
-              <a:t>Decision making</a:t>
-            </a:r>
-          </a:p>
-        </p:txBody>
-      </p:sp>
-      <p:sp>
-        <p:nvSpPr>
-          <p:cNvPr id="3" name="Content Placeholder 2"/>
-          <p:cNvSpPr>
-            <a:spLocks noGrp="1"/>
-          </p:cNvSpPr>
-          <p:nvPr>
-            <p:ph idx="1"/>
-          </p:nvPr>
-        </p:nvSpPr>
-        <p:spPr>
-          <a:xfrm>
-            <a:off x="609599" y="1484672"/>
-            <a:ext cx="6347714" cy="4556692"/>
-          </a:xfrm>
-        </p:spPr>
-        <p:txBody>
-          <a:bodyPr/>
-          <a:lstStyle/>
-          <a:p>
-            <a:r>
-              <a:rPr lang="de-CH" dirty="0"/>
-              <a:t>In order to decide to whom the agent wants to propose, he computes:</a:t>
-            </a:r>
-          </a:p>
-          <a:p>
-            <a:endParaRPr lang="de-CH" dirty="0"/>
-          </a:p>
-          <a:p>
-            <a:endParaRPr lang="de-CH" dirty="0"/>
-          </a:p>
-          <a:p>
-            <a:endParaRPr lang="de-CH" dirty="0"/>
-          </a:p>
-          <a:p>
-            <a:r>
-              <a:rPr lang="de-CH" dirty="0"/>
-              <a:t>In order to decide which trade to accept, he computes:</a:t>
-            </a:r>
-          </a:p>
-        </p:txBody>
-      </p:sp>
-      <p:pic>
-        <p:nvPicPr>
-          <p:cNvPr id="5" name="Picture 4"/>
-          <p:cNvPicPr>
-            <a:picLocks noChangeAspect="1"/>
-          </p:cNvPicPr>
-          <p:nvPr/>
-        </p:nvPicPr>
-        <p:blipFill>
-          <a:blip r:embed="rId2"/>
-          <a:stretch>
-            <a:fillRect/>
-          </a:stretch>
-        </p:blipFill>
-        <p:spPr>
-          <a:xfrm>
-            <a:off x="863773" y="2222749"/>
-            <a:ext cx="6447501" cy="739976"/>
-          </a:xfrm>
-          <a:prstGeom prst="rect">
-            <a:avLst/>
-          </a:prstGeom>
-        </p:spPr>
-      </p:pic>
-      <p:pic>
-        <p:nvPicPr>
-          <p:cNvPr id="8" name="Picture 7"/>
-          <p:cNvPicPr>
-            <a:picLocks noChangeAspect="1"/>
-          </p:cNvPicPr>
-          <p:nvPr/>
-        </p:nvPicPr>
-        <p:blipFill>
-          <a:blip r:embed="rId3"/>
-          <a:stretch>
-            <a:fillRect/>
-          </a:stretch>
-        </p:blipFill>
-        <p:spPr>
-          <a:xfrm>
-            <a:off x="1107613" y="3763018"/>
-            <a:ext cx="6093539" cy="1513682"/>
-          </a:xfrm>
-          <a:prstGeom prst="rect">
-            <a:avLst/>
-          </a:prstGeom>
-        </p:spPr>
-      </p:pic>
-    </p:spTree>
-    <p:extLst>
-      <p:ext uri="{BB962C8B-B14F-4D97-AF65-F5344CB8AC3E}">
-        <p14:creationId xmlns:p14="http://schemas.microsoft.com/office/powerpoint/2010/main" val="544881558"/>
       </p:ext>
     </p:extLst>
   </p:cSld>
@@ -8840,6 +8943,168 @@
 </p:sld>
 </file>
 
+<file path=ppt/slides/slide8.xml><?xml version="1.0" encoding="utf-8"?>
+<p:sld xmlns:a="http://schemas.openxmlformats.org/drawingml/2006/main" xmlns:r="http://schemas.openxmlformats.org/officeDocument/2006/relationships" xmlns:p="http://schemas.openxmlformats.org/presentationml/2006/main">
+  <p:cSld>
+    <p:spTree>
+      <p:nvGrpSpPr>
+        <p:cNvPr id="1" name=""/>
+        <p:cNvGrpSpPr/>
+        <p:nvPr/>
+      </p:nvGrpSpPr>
+      <p:grpSpPr>
+        <a:xfrm>
+          <a:off x="0" y="0"/>
+          <a:ext cx="0" cy="0"/>
+          <a:chOff x="0" y="0"/>
+          <a:chExt cx="0" cy="0"/>
+        </a:xfrm>
+      </p:grpSpPr>
+      <p:sp>
+        <p:nvSpPr>
+          <p:cNvPr id="2" name="Title 1"/>
+          <p:cNvSpPr>
+            <a:spLocks noGrp="1"/>
+          </p:cNvSpPr>
+          <p:nvPr>
+            <p:ph type="title"/>
+          </p:nvPr>
+        </p:nvSpPr>
+        <p:spPr/>
+        <p:txBody>
+          <a:bodyPr/>
+          <a:lstStyle/>
+          <a:p>
+            <a:r>
+              <a:rPr lang="de-CH" dirty="0"/>
+              <a:t>Emerging behaviour of our agents</a:t>
+            </a:r>
+          </a:p>
+        </p:txBody>
+      </p:sp>
+      <p:sp>
+        <p:nvSpPr>
+          <p:cNvPr id="3" name="Content Placeholder 2"/>
+          <p:cNvSpPr>
+            <a:spLocks noGrp="1"/>
+          </p:cNvSpPr>
+          <p:nvPr>
+            <p:ph idx="1"/>
+          </p:nvPr>
+        </p:nvSpPr>
+        <p:spPr/>
+        <p:txBody>
+          <a:bodyPr/>
+          <a:lstStyle/>
+          <a:p>
+            <a:r>
+              <a:rPr lang="de-CH" dirty="0"/>
+              <a:t>Clustering around profitable places</a:t>
+            </a:r>
+          </a:p>
+          <a:p>
+            <a:r>
+              <a:rPr lang="de-CH" dirty="0"/>
+              <a:t>Few agents are able to initiate mass migration (building bridges)</a:t>
+            </a:r>
+          </a:p>
+          <a:p>
+            <a:r>
+              <a:rPr lang="de-CH" dirty="0"/>
+              <a:t>Achieving of an equilibrium in certain scenarios</a:t>
+            </a:r>
+          </a:p>
+        </p:txBody>
+      </p:sp>
+    </p:spTree>
+    <p:extLst>
+      <p:ext uri="{BB962C8B-B14F-4D97-AF65-F5344CB8AC3E}">
+        <p14:creationId xmlns:p14="http://schemas.microsoft.com/office/powerpoint/2010/main" val="391397781"/>
+      </p:ext>
+    </p:extLst>
+  </p:cSld>
+  <p:clrMapOvr>
+    <a:masterClrMapping/>
+  </p:clrMapOvr>
+</p:sld>
+</file>
+
+<file path=ppt/slides/slide9.xml><?xml version="1.0" encoding="utf-8"?>
+<p:sld xmlns:a="http://schemas.openxmlformats.org/drawingml/2006/main" xmlns:r="http://schemas.openxmlformats.org/officeDocument/2006/relationships" xmlns:p="http://schemas.openxmlformats.org/presentationml/2006/main">
+  <p:cSld>
+    <p:spTree>
+      <p:nvGrpSpPr>
+        <p:cNvPr id="1" name=""/>
+        <p:cNvGrpSpPr/>
+        <p:nvPr/>
+      </p:nvGrpSpPr>
+      <p:grpSpPr>
+        <a:xfrm>
+          <a:off x="0" y="0"/>
+          <a:ext cx="0" cy="0"/>
+          <a:chOff x="0" y="0"/>
+          <a:chExt cx="0" cy="0"/>
+        </a:xfrm>
+      </p:grpSpPr>
+      <p:sp>
+        <p:nvSpPr>
+          <p:cNvPr id="2" name="Title 1"/>
+          <p:cNvSpPr>
+            <a:spLocks noGrp="1"/>
+          </p:cNvSpPr>
+          <p:nvPr>
+            <p:ph type="title"/>
+          </p:nvPr>
+        </p:nvSpPr>
+        <p:spPr/>
+        <p:txBody>
+          <a:bodyPr>
+            <a:normAutofit/>
+          </a:bodyPr>
+          <a:lstStyle/>
+          <a:p>
+            <a:r>
+              <a:rPr lang="de-CH" dirty="0"/>
+              <a:t>Possible simulations with our model</a:t>
+            </a:r>
+          </a:p>
+        </p:txBody>
+      </p:sp>
+      <p:sp>
+        <p:nvSpPr>
+          <p:cNvPr id="3" name="Content Placeholder 2"/>
+          <p:cNvSpPr>
+            <a:spLocks noGrp="1"/>
+          </p:cNvSpPr>
+          <p:nvPr>
+            <p:ph idx="1"/>
+          </p:nvPr>
+        </p:nvSpPr>
+        <p:spPr/>
+        <p:txBody>
+          <a:bodyPr/>
+          <a:lstStyle/>
+          <a:p>
+            <a:r>
+              <a:rPr lang="de-CH" dirty="0"/>
+              <a:t>Expanding of humans on islands</a:t>
+            </a:r>
+          </a:p>
+        </p:txBody>
+      </p:sp>
+    </p:spTree>
+    <p:extLst>
+      <p:ext uri="{BB962C8B-B14F-4D97-AF65-F5344CB8AC3E}">
+        <p14:creationId xmlns:p14="http://schemas.microsoft.com/office/powerpoint/2010/main" val="421451470"/>
+      </p:ext>
+    </p:extLst>
+  </p:cSld>
+  <p:clrMapOvr>
+    <a:masterClrMapping/>
+  </p:clrMapOvr>
+</p:sld>
+</file>
+
 <file path=ppt/theme/theme1.xml><?xml version="1.0" encoding="utf-8"?>
 <a:theme xmlns:a="http://schemas.openxmlformats.org/drawingml/2006/main" name="Facet">
   <a:themeElements>

</xml_diff>